<commit_message>
Add small icons to index pages
</commit_message>
<xml_diff>
--- a/assets/figure_generator.pptx
+++ b/assets/figure_generator.pptx
@@ -267,7 +267,7 @@
           <a:p>
             <a:fld id="{938CA2F2-015C-42C2-B33A-63325C7A3D24}" type="datetimeFigureOut">
               <a:rPr lang="en-CA" smtClean="0"/>
-              <a:t>2023-09-07</a:t>
+              <a:t>2023-10-13</a:t>
             </a:fld>
             <a:endParaRPr lang="en-CA"/>
           </a:p>
@@ -467,7 +467,7 @@
           <a:p>
             <a:fld id="{938CA2F2-015C-42C2-B33A-63325C7A3D24}" type="datetimeFigureOut">
               <a:rPr lang="en-CA" smtClean="0"/>
-              <a:t>2023-09-07</a:t>
+              <a:t>2023-10-13</a:t>
             </a:fld>
             <a:endParaRPr lang="en-CA"/>
           </a:p>
@@ -677,7 +677,7 @@
           <a:p>
             <a:fld id="{938CA2F2-015C-42C2-B33A-63325C7A3D24}" type="datetimeFigureOut">
               <a:rPr lang="en-CA" smtClean="0"/>
-              <a:t>2023-09-07</a:t>
+              <a:t>2023-10-13</a:t>
             </a:fld>
             <a:endParaRPr lang="en-CA"/>
           </a:p>
@@ -877,7 +877,7 @@
           <a:p>
             <a:fld id="{938CA2F2-015C-42C2-B33A-63325C7A3D24}" type="datetimeFigureOut">
               <a:rPr lang="en-CA" smtClean="0"/>
-              <a:t>2023-09-07</a:t>
+              <a:t>2023-10-13</a:t>
             </a:fld>
             <a:endParaRPr lang="en-CA"/>
           </a:p>
@@ -1153,7 +1153,7 @@
           <a:p>
             <a:fld id="{938CA2F2-015C-42C2-B33A-63325C7A3D24}" type="datetimeFigureOut">
               <a:rPr lang="en-CA" smtClean="0"/>
-              <a:t>2023-09-07</a:t>
+              <a:t>2023-10-13</a:t>
             </a:fld>
             <a:endParaRPr lang="en-CA"/>
           </a:p>
@@ -1421,7 +1421,7 @@
           <a:p>
             <a:fld id="{938CA2F2-015C-42C2-B33A-63325C7A3D24}" type="datetimeFigureOut">
               <a:rPr lang="en-CA" smtClean="0"/>
-              <a:t>2023-09-07</a:t>
+              <a:t>2023-10-13</a:t>
             </a:fld>
             <a:endParaRPr lang="en-CA"/>
           </a:p>
@@ -1836,7 +1836,7 @@
           <a:p>
             <a:fld id="{938CA2F2-015C-42C2-B33A-63325C7A3D24}" type="datetimeFigureOut">
               <a:rPr lang="en-CA" smtClean="0"/>
-              <a:t>2023-09-07</a:t>
+              <a:t>2023-10-13</a:t>
             </a:fld>
             <a:endParaRPr lang="en-CA"/>
           </a:p>
@@ -1978,7 +1978,7 @@
           <a:p>
             <a:fld id="{938CA2F2-015C-42C2-B33A-63325C7A3D24}" type="datetimeFigureOut">
               <a:rPr lang="en-CA" smtClean="0"/>
-              <a:t>2023-09-07</a:t>
+              <a:t>2023-10-13</a:t>
             </a:fld>
             <a:endParaRPr lang="en-CA"/>
           </a:p>
@@ -2091,7 +2091,7 @@
           <a:p>
             <a:fld id="{938CA2F2-015C-42C2-B33A-63325C7A3D24}" type="datetimeFigureOut">
               <a:rPr lang="en-CA" smtClean="0"/>
-              <a:t>2023-09-07</a:t>
+              <a:t>2023-10-13</a:t>
             </a:fld>
             <a:endParaRPr lang="en-CA"/>
           </a:p>
@@ -2404,7 +2404,7 @@
           <a:p>
             <a:fld id="{938CA2F2-015C-42C2-B33A-63325C7A3D24}" type="datetimeFigureOut">
               <a:rPr lang="en-CA" smtClean="0"/>
-              <a:t>2023-09-07</a:t>
+              <a:t>2023-10-13</a:t>
             </a:fld>
             <a:endParaRPr lang="en-CA"/>
           </a:p>
@@ -2693,7 +2693,7 @@
           <a:p>
             <a:fld id="{938CA2F2-015C-42C2-B33A-63325C7A3D24}" type="datetimeFigureOut">
               <a:rPr lang="en-CA" smtClean="0"/>
-              <a:t>2023-09-07</a:t>
+              <a:t>2023-10-13</a:t>
             </a:fld>
             <a:endParaRPr lang="en-CA"/>
           </a:p>
@@ -2936,7 +2936,7 @@
           <a:p>
             <a:fld id="{938CA2F2-015C-42C2-B33A-63325C7A3D24}" type="datetimeFigureOut">
               <a:rPr lang="en-CA" smtClean="0"/>
-              <a:t>2023-09-07</a:t>
+              <a:t>2023-10-13</a:t>
             </a:fld>
             <a:endParaRPr lang="en-CA"/>
           </a:p>
@@ -6296,8 +6296,8 @@
         </p:nvSpPr>
         <p:spPr>
           <a:xfrm>
-            <a:off x="8772027" y="786610"/>
-            <a:ext cx="3168000" cy="844831"/>
+            <a:off x="8772027" y="948535"/>
+            <a:ext cx="3168000" cy="540000"/>
           </a:xfrm>
           <a:prstGeom prst="roundRect">
             <a:avLst>
@@ -6358,8 +6358,8 @@
         </p:nvSpPr>
         <p:spPr>
           <a:xfrm>
-            <a:off x="8802189" y="2287590"/>
-            <a:ext cx="3168000" cy="844831"/>
+            <a:off x="8802189" y="2449515"/>
+            <a:ext cx="3168000" cy="540000"/>
           </a:xfrm>
           <a:prstGeom prst="roundRect">
             <a:avLst>
@@ -6420,8 +6420,8 @@
         </p:nvSpPr>
         <p:spPr>
           <a:xfrm>
-            <a:off x="4857728" y="795253"/>
-            <a:ext cx="3168000" cy="844831"/>
+            <a:off x="4857728" y="957178"/>
+            <a:ext cx="3168000" cy="540000"/>
           </a:xfrm>
           <a:prstGeom prst="roundRect">
             <a:avLst>
@@ -6482,8 +6482,8 @@
         </p:nvSpPr>
         <p:spPr>
           <a:xfrm>
-            <a:off x="4857729" y="2300591"/>
-            <a:ext cx="3168000" cy="844831"/>
+            <a:off x="4857729" y="2462516"/>
+            <a:ext cx="3168000" cy="540000"/>
           </a:xfrm>
           <a:prstGeom prst="roundRect">
             <a:avLst>
@@ -6544,8 +6544,8 @@
         </p:nvSpPr>
         <p:spPr>
           <a:xfrm>
-            <a:off x="824653" y="2299585"/>
-            <a:ext cx="3168000" cy="844831"/>
+            <a:off x="824653" y="2461510"/>
+            <a:ext cx="3168000" cy="540000"/>
           </a:xfrm>
           <a:prstGeom prst="roundRect">
             <a:avLst>
@@ -6606,8 +6606,8 @@
         </p:nvSpPr>
         <p:spPr>
           <a:xfrm>
-            <a:off x="8141895" y="692618"/>
-            <a:ext cx="1007706" cy="1017037"/>
+            <a:off x="8541945" y="892643"/>
+            <a:ext cx="630000" cy="630000"/>
           </a:xfrm>
           <a:prstGeom prst="ellipse">
             <a:avLst/>
@@ -6685,8 +6685,8 @@
         </p:blipFill>
         <p:spPr>
           <a:xfrm>
-            <a:off x="8244524" y="795254"/>
-            <a:ext cx="811765" cy="811765"/>
+            <a:off x="8587424" y="947654"/>
+            <a:ext cx="540000" cy="540000"/>
           </a:xfrm>
           <a:prstGeom prst="rect">
             <a:avLst/>
@@ -6743,8 +6743,8 @@
         </p:nvSpPr>
         <p:spPr>
           <a:xfrm>
-            <a:off x="8169888" y="2192694"/>
-            <a:ext cx="1007706" cy="1017037"/>
+            <a:off x="8569938" y="2392719"/>
+            <a:ext cx="630000" cy="630000"/>
           </a:xfrm>
           <a:prstGeom prst="ellipse">
             <a:avLst/>
@@ -6821,8 +6821,8 @@
         </p:blipFill>
         <p:spPr>
           <a:xfrm>
-            <a:off x="8232039" y="2262261"/>
-            <a:ext cx="888740" cy="888740"/>
+            <a:off x="8613039" y="2433711"/>
+            <a:ext cx="540000" cy="540000"/>
           </a:xfrm>
           <a:prstGeom prst="rect">
             <a:avLst/>
@@ -6843,7 +6843,7 @@
         </p:nvSpPr>
         <p:spPr>
           <a:xfrm>
-            <a:off x="9122964" y="2367257"/>
+            <a:off x="9122964" y="2386307"/>
             <a:ext cx="2856887" cy="646331"/>
           </a:xfrm>
           <a:prstGeom prst="rect">
@@ -6879,8 +6879,8 @@
         </p:nvSpPr>
         <p:spPr>
           <a:xfrm>
-            <a:off x="830162" y="795253"/>
-            <a:ext cx="3168000" cy="844831"/>
+            <a:off x="830162" y="957178"/>
+            <a:ext cx="3168000" cy="540000"/>
           </a:xfrm>
           <a:prstGeom prst="roundRect">
             <a:avLst>
@@ -6941,8 +6941,8 @@
         </p:nvSpPr>
         <p:spPr>
           <a:xfrm>
-            <a:off x="223677" y="692618"/>
-            <a:ext cx="1007706" cy="1017037"/>
+            <a:off x="623727" y="892643"/>
+            <a:ext cx="630000" cy="630000"/>
           </a:xfrm>
           <a:prstGeom prst="ellipse">
             <a:avLst/>
@@ -7020,8 +7020,8 @@
         </p:blipFill>
         <p:spPr>
           <a:xfrm>
-            <a:off x="326306" y="795254"/>
-            <a:ext cx="811765" cy="811765"/>
+            <a:off x="669206" y="947654"/>
+            <a:ext cx="540000" cy="540000"/>
           </a:xfrm>
           <a:prstGeom prst="rect">
             <a:avLst/>
@@ -7078,8 +7078,8 @@
         </p:nvSpPr>
         <p:spPr>
           <a:xfrm>
-            <a:off x="251670" y="2192694"/>
-            <a:ext cx="1007706" cy="1017037"/>
+            <a:off x="651720" y="2392719"/>
+            <a:ext cx="630000" cy="630000"/>
           </a:xfrm>
           <a:prstGeom prst="ellipse">
             <a:avLst/>
@@ -7156,8 +7156,8 @@
         </p:blipFill>
         <p:spPr>
           <a:xfrm>
-            <a:off x="313821" y="2262261"/>
-            <a:ext cx="888740" cy="888740"/>
+            <a:off x="694821" y="2433711"/>
+            <a:ext cx="540000" cy="540000"/>
           </a:xfrm>
           <a:prstGeom prst="rect">
             <a:avLst/>
@@ -7214,8 +7214,8 @@
         </p:nvSpPr>
         <p:spPr>
           <a:xfrm>
-            <a:off x="4251244" y="692618"/>
-            <a:ext cx="1007706" cy="1017037"/>
+            <a:off x="4651294" y="892643"/>
+            <a:ext cx="630000" cy="630000"/>
           </a:xfrm>
           <a:prstGeom prst="ellipse">
             <a:avLst/>
@@ -7293,8 +7293,8 @@
         </p:blipFill>
         <p:spPr>
           <a:xfrm>
-            <a:off x="4353873" y="795254"/>
-            <a:ext cx="811765" cy="811765"/>
+            <a:off x="4696773" y="947654"/>
+            <a:ext cx="540000" cy="540000"/>
           </a:xfrm>
           <a:prstGeom prst="rect">
             <a:avLst/>
@@ -7351,8 +7351,8 @@
         </p:nvSpPr>
         <p:spPr>
           <a:xfrm>
-            <a:off x="4279237" y="2192694"/>
-            <a:ext cx="1007706" cy="1017037"/>
+            <a:off x="4679287" y="2392719"/>
+            <a:ext cx="630000" cy="630000"/>
           </a:xfrm>
           <a:prstGeom prst="ellipse">
             <a:avLst/>
@@ -7429,8 +7429,8 @@
         </p:blipFill>
         <p:spPr>
           <a:xfrm>
-            <a:off x="4341388" y="2262261"/>
-            <a:ext cx="888740" cy="888740"/>
+            <a:off x="4722388" y="2433711"/>
+            <a:ext cx="540000" cy="540000"/>
           </a:xfrm>
           <a:prstGeom prst="rect">
             <a:avLst/>
@@ -7473,47 +7473,12 @@
           </a:p>
         </p:txBody>
       </p:sp>
-      <p:sp>
-        <p:nvSpPr>
-          <p:cNvPr id="15" name="TextBox 14">
-            <a:extLst>
-              <a:ext uri="{FF2B5EF4-FFF2-40B4-BE49-F238E27FC236}">
-                <a16:creationId xmlns:a16="http://schemas.microsoft.com/office/drawing/2014/main" id="{4A27E163-42F2-4FF4-8217-5BC62C07E023}"/>
-              </a:ext>
-            </a:extLst>
-          </p:cNvPr>
-          <p:cNvSpPr txBox="1"/>
-          <p:nvPr/>
-        </p:nvSpPr>
-        <p:spPr>
-          <a:xfrm>
-            <a:off x="4446227" y="5508446"/>
-            <a:ext cx="5909800" cy="400110"/>
-          </a:xfrm>
-          <a:prstGeom prst="rect">
-            <a:avLst/>
-          </a:prstGeom>
-          <a:noFill/>
-        </p:spPr>
-        <p:txBody>
-          <a:bodyPr wrap="square" rtlCol="0">
-            <a:spAutoFit/>
-          </a:bodyPr>
-          <a:lstStyle/>
-          <a:p>
-            <a:r>
-              <a:rPr lang="en-CA" sz="2000" dirty="0"/>
-              <a:t>3D simulation of airborne FDEM data.</a:t>
-            </a:r>
-          </a:p>
-        </p:txBody>
-      </p:sp>
       <p:pic>
         <p:nvPicPr>
-          <p:cNvPr id="17" name="Picture 16">
-            <a:extLst>
-              <a:ext uri="{FF2B5EF4-FFF2-40B4-BE49-F238E27FC236}">
-                <a16:creationId xmlns:a16="http://schemas.microsoft.com/office/drawing/2014/main" id="{419AE956-7C31-10A7-3558-7B7787564736}"/>
+          <p:cNvPr id="19" name="Picture 18">
+            <a:extLst>
+              <a:ext uri="{FF2B5EF4-FFF2-40B4-BE49-F238E27FC236}">
+                <a16:creationId xmlns:a16="http://schemas.microsoft.com/office/drawing/2014/main" id="{90595793-F567-6592-9267-3BDE7C4D870C}"/>
               </a:ext>
             </a:extLst>
           </p:cNvPr>
@@ -7530,8 +7495,8 @@
         </p:blipFill>
         <p:spPr>
           <a:xfrm>
-            <a:off x="817241" y="4873816"/>
-            <a:ext cx="1788931" cy="564469"/>
+            <a:off x="2744504" y="4959326"/>
+            <a:ext cx="1406012" cy="435521"/>
           </a:xfrm>
           <a:prstGeom prst="rect">
             <a:avLst/>
@@ -7540,10 +7505,10 @@
       </p:pic>
       <p:pic>
         <p:nvPicPr>
-          <p:cNvPr id="19" name="Picture 18">
-            <a:extLst>
-              <a:ext uri="{FF2B5EF4-FFF2-40B4-BE49-F238E27FC236}">
-                <a16:creationId xmlns:a16="http://schemas.microsoft.com/office/drawing/2014/main" id="{90595793-F567-6592-9267-3BDE7C4D870C}"/>
+          <p:cNvPr id="28" name="Picture 27">
+            <a:extLst>
+              <a:ext uri="{FF2B5EF4-FFF2-40B4-BE49-F238E27FC236}">
+                <a16:creationId xmlns:a16="http://schemas.microsoft.com/office/drawing/2014/main" id="{6403AF3A-0A5B-5FA7-F7E6-BF164A1A8697}"/>
               </a:ext>
             </a:extLst>
           </p:cNvPr>
@@ -7560,73 +7525,8 @@
         </p:blipFill>
         <p:spPr>
           <a:xfrm>
-            <a:off x="2620168" y="5407196"/>
-            <a:ext cx="1861900" cy="576735"/>
-          </a:xfrm>
-          <a:prstGeom prst="rect">
-            <a:avLst/>
-          </a:prstGeom>
-        </p:spPr>
-      </p:pic>
-      <p:sp>
-        <p:nvSpPr>
-          <p:cNvPr id="24" name="TextBox 23">
-            <a:extLst>
-              <a:ext uri="{FF2B5EF4-FFF2-40B4-BE49-F238E27FC236}">
-                <a16:creationId xmlns:a16="http://schemas.microsoft.com/office/drawing/2014/main" id="{2BB10957-1354-1BD7-1965-A4FACBE241E8}"/>
-              </a:ext>
-            </a:extLst>
-          </p:cNvPr>
-          <p:cNvSpPr txBox="1"/>
-          <p:nvPr/>
-        </p:nvSpPr>
-        <p:spPr>
-          <a:xfrm>
-            <a:off x="4446227" y="4964664"/>
-            <a:ext cx="5909800" cy="400110"/>
-          </a:xfrm>
-          <a:prstGeom prst="rect">
-            <a:avLst/>
-          </a:prstGeom>
-          <a:noFill/>
-        </p:spPr>
-        <p:txBody>
-          <a:bodyPr wrap="square" rtlCol="0">
-            <a:spAutoFit/>
-          </a:bodyPr>
-          <a:lstStyle/>
-          <a:p>
-            <a:r>
-              <a:rPr lang="en-CA" sz="2000" dirty="0"/>
-              <a:t>1D inversion of airborne FDEM data.</a:t>
-            </a:r>
-          </a:p>
-        </p:txBody>
-      </p:sp>
-      <p:pic>
-        <p:nvPicPr>
-          <p:cNvPr id="25" name="Picture 24">
-            <a:extLst>
-              <a:ext uri="{FF2B5EF4-FFF2-40B4-BE49-F238E27FC236}">
-                <a16:creationId xmlns:a16="http://schemas.microsoft.com/office/drawing/2014/main" id="{873A4088-0692-C3FE-054D-32AEA450031A}"/>
-              </a:ext>
-            </a:extLst>
-          </p:cNvPr>
-          <p:cNvPicPr>
-            <a:picLocks noChangeAspect="1"/>
-          </p:cNvPicPr>
-          <p:nvPr/>
-        </p:nvPicPr>
-        <p:blipFill>
-          <a:blip r:embed="rId6"/>
-          <a:stretch>
-            <a:fillRect/>
-          </a:stretch>
-        </p:blipFill>
-        <p:spPr>
-          <a:xfrm>
-            <a:off x="817241" y="5397691"/>
-            <a:ext cx="1788931" cy="564469"/>
+            <a:off x="817241" y="4322897"/>
+            <a:ext cx="1412870" cy="445809"/>
           </a:xfrm>
           <a:prstGeom prst="rect">
             <a:avLst/>
@@ -7635,10 +7535,10 @@
       </p:pic>
       <p:pic>
         <p:nvPicPr>
-          <p:cNvPr id="27" name="Picture 26">
-            <a:extLst>
-              <a:ext uri="{FF2B5EF4-FFF2-40B4-BE49-F238E27FC236}">
-                <a16:creationId xmlns:a16="http://schemas.microsoft.com/office/drawing/2014/main" id="{3C241739-9495-C841-418D-938F820C4DD2}"/>
+          <p:cNvPr id="34" name="Picture 33">
+            <a:extLst>
+              <a:ext uri="{FF2B5EF4-FFF2-40B4-BE49-F238E27FC236}">
+                <a16:creationId xmlns:a16="http://schemas.microsoft.com/office/drawing/2014/main" id="{FFA79105-BD92-3785-ECEF-9E0042EA1BFF}"/>
               </a:ext>
             </a:extLst>
           </p:cNvPr>
@@ -7655,144 +7555,14 @@
         </p:blipFill>
         <p:spPr>
           <a:xfrm>
-            <a:off x="2613875" y="4873816"/>
-            <a:ext cx="1860489" cy="564469"/>
+            <a:off x="2744504" y="4322896"/>
+            <a:ext cx="1412870" cy="428662"/>
           </a:xfrm>
           <a:prstGeom prst="rect">
             <a:avLst/>
           </a:prstGeom>
         </p:spPr>
       </p:pic>
-      <p:pic>
-        <p:nvPicPr>
-          <p:cNvPr id="28" name="Picture 27">
-            <a:extLst>
-              <a:ext uri="{FF2B5EF4-FFF2-40B4-BE49-F238E27FC236}">
-                <a16:creationId xmlns:a16="http://schemas.microsoft.com/office/drawing/2014/main" id="{6403AF3A-0A5B-5FA7-F7E6-BF164A1A8697}"/>
-              </a:ext>
-            </a:extLst>
-          </p:cNvPr>
-          <p:cNvPicPr>
-            <a:picLocks noChangeAspect="1"/>
-          </p:cNvPicPr>
-          <p:nvPr/>
-        </p:nvPicPr>
-        <p:blipFill>
-          <a:blip r:embed="rId6"/>
-          <a:stretch>
-            <a:fillRect/>
-          </a:stretch>
-        </p:blipFill>
-        <p:spPr>
-          <a:xfrm>
-            <a:off x="817241" y="4322897"/>
-            <a:ext cx="1788931" cy="564469"/>
-          </a:xfrm>
-          <a:prstGeom prst="rect">
-            <a:avLst/>
-          </a:prstGeom>
-        </p:spPr>
-      </p:pic>
-      <p:sp>
-        <p:nvSpPr>
-          <p:cNvPr id="33" name="TextBox 32">
-            <a:extLst>
-              <a:ext uri="{FF2B5EF4-FFF2-40B4-BE49-F238E27FC236}">
-                <a16:creationId xmlns:a16="http://schemas.microsoft.com/office/drawing/2014/main" id="{AA80140B-8305-4446-C048-6FB1535CA402}"/>
-              </a:ext>
-            </a:extLst>
-          </p:cNvPr>
-          <p:cNvSpPr txBox="1"/>
-          <p:nvPr/>
-        </p:nvSpPr>
-        <p:spPr>
-          <a:xfrm>
-            <a:off x="4446227" y="4404220"/>
-            <a:ext cx="5909800" cy="400110"/>
-          </a:xfrm>
-          <a:prstGeom prst="rect">
-            <a:avLst/>
-          </a:prstGeom>
-          <a:noFill/>
-        </p:spPr>
-        <p:txBody>
-          <a:bodyPr wrap="square" rtlCol="0">
-            <a:spAutoFit/>
-          </a:bodyPr>
-          <a:lstStyle/>
-          <a:p>
-            <a:r>
-              <a:rPr lang="en-CA" sz="2000" dirty="0"/>
-              <a:t>1D simulation of airborne FDEM data.</a:t>
-            </a:r>
-          </a:p>
-        </p:txBody>
-      </p:sp>
-      <p:pic>
-        <p:nvPicPr>
-          <p:cNvPr id="34" name="Picture 33">
-            <a:extLst>
-              <a:ext uri="{FF2B5EF4-FFF2-40B4-BE49-F238E27FC236}">
-                <a16:creationId xmlns:a16="http://schemas.microsoft.com/office/drawing/2014/main" id="{FFA79105-BD92-3785-ECEF-9E0042EA1BFF}"/>
-              </a:ext>
-            </a:extLst>
-          </p:cNvPr>
-          <p:cNvPicPr>
-            <a:picLocks noChangeAspect="1"/>
-          </p:cNvPicPr>
-          <p:nvPr/>
-        </p:nvPicPr>
-        <p:blipFill>
-          <a:blip r:embed="rId8"/>
-          <a:stretch>
-            <a:fillRect/>
-          </a:stretch>
-        </p:blipFill>
-        <p:spPr>
-          <a:xfrm>
-            <a:off x="2613875" y="4322897"/>
-            <a:ext cx="1860489" cy="564469"/>
-          </a:xfrm>
-          <a:prstGeom prst="rect">
-            <a:avLst/>
-          </a:prstGeom>
-        </p:spPr>
-      </p:pic>
-      <p:sp>
-        <p:nvSpPr>
-          <p:cNvPr id="35" name="TextBox 34">
-            <a:extLst>
-              <a:ext uri="{FF2B5EF4-FFF2-40B4-BE49-F238E27FC236}">
-                <a16:creationId xmlns:a16="http://schemas.microsoft.com/office/drawing/2014/main" id="{EFD3BAE9-5CF2-C12E-66A4-7A04B8EE8422}"/>
-              </a:ext>
-            </a:extLst>
-          </p:cNvPr>
-          <p:cNvSpPr txBox="1"/>
-          <p:nvPr/>
-        </p:nvSpPr>
-        <p:spPr>
-          <a:xfrm>
-            <a:off x="4446227" y="6035042"/>
-            <a:ext cx="5909800" cy="400110"/>
-          </a:xfrm>
-          <a:prstGeom prst="rect">
-            <a:avLst/>
-          </a:prstGeom>
-          <a:noFill/>
-        </p:spPr>
-        <p:txBody>
-          <a:bodyPr wrap="square" rtlCol="0">
-            <a:spAutoFit/>
-          </a:bodyPr>
-          <a:lstStyle/>
-          <a:p>
-            <a:r>
-              <a:rPr lang="en-CA" sz="2000" dirty="0"/>
-              <a:t>3D inversion of airborne FDEM data.</a:t>
-            </a:r>
-          </a:p>
-        </p:txBody>
-      </p:sp>
       <p:pic>
         <p:nvPicPr>
           <p:cNvPr id="39" name="Picture 38">
@@ -7815,8 +7585,8 @@
         </p:blipFill>
         <p:spPr>
           <a:xfrm>
-            <a:off x="2598914" y="5945831"/>
-            <a:ext cx="1892679" cy="550515"/>
+            <a:off x="2744503" y="5605593"/>
+            <a:ext cx="1426588" cy="414945"/>
           </a:xfrm>
           <a:prstGeom prst="rect">
             <a:avLst/>
@@ -7845,8 +7615,200 @@
         </p:blipFill>
         <p:spPr>
           <a:xfrm>
-            <a:off x="824653" y="5945831"/>
-            <a:ext cx="1781519" cy="560282"/>
+            <a:off x="832356" y="4959328"/>
+            <a:ext cx="1395724" cy="438950"/>
+          </a:xfrm>
+          <a:prstGeom prst="rect">
+            <a:avLst/>
+          </a:prstGeom>
+        </p:spPr>
+      </p:pic>
+      <p:pic>
+        <p:nvPicPr>
+          <p:cNvPr id="10" name="Picture 9">
+            <a:extLst>
+              <a:ext uri="{FF2B5EF4-FFF2-40B4-BE49-F238E27FC236}">
+                <a16:creationId xmlns:a16="http://schemas.microsoft.com/office/drawing/2014/main" id="{F5C74B23-DC22-495C-EC6F-7D7B9996AF58}"/>
+              </a:ext>
+            </a:extLst>
+          </p:cNvPr>
+          <p:cNvPicPr>
+            <a:picLocks noChangeAspect="1"/>
+          </p:cNvPicPr>
+          <p:nvPr/>
+        </p:nvPicPr>
+        <p:blipFill>
+          <a:blip r:embed="rId11"/>
+          <a:stretch>
+            <a:fillRect/>
+          </a:stretch>
+        </p:blipFill>
+        <p:spPr>
+          <a:xfrm>
+            <a:off x="832356" y="5605593"/>
+            <a:ext cx="1426588" cy="418374"/>
+          </a:xfrm>
+          <a:prstGeom prst="rect">
+            <a:avLst/>
+          </a:prstGeom>
+        </p:spPr>
+      </p:pic>
+      <p:sp>
+        <p:nvSpPr>
+          <p:cNvPr id="27" name="Rectangle: Rounded Corners 26">
+            <a:extLst>
+              <a:ext uri="{FF2B5EF4-FFF2-40B4-BE49-F238E27FC236}">
+                <a16:creationId xmlns:a16="http://schemas.microsoft.com/office/drawing/2014/main" id="{D114A096-F905-A7DB-35D7-B246B9B6A73C}"/>
+              </a:ext>
+            </a:extLst>
+          </p:cNvPr>
+          <p:cNvSpPr/>
+          <p:nvPr/>
+        </p:nvSpPr>
+        <p:spPr>
+          <a:xfrm>
+            <a:off x="6752407" y="4210050"/>
+            <a:ext cx="1981520" cy="360000"/>
+          </a:xfrm>
+          <a:prstGeom prst="roundRect">
+            <a:avLst>
+              <a:gd name="adj" fmla="val 34475"/>
+            </a:avLst>
+          </a:prstGeom>
+          <a:solidFill>
+            <a:srgbClr val="FF2D2D"/>
+          </a:solidFill>
+          <a:ln>
+            <a:noFill/>
+          </a:ln>
+          <a:effectLst/>
+          <a:scene3d>
+            <a:camera prst="orthographicFront"/>
+            <a:lightRig rig="threePt" dir="t"/>
+          </a:scene3d>
+          <a:sp3d>
+            <a:bevelT w="50800" h="50800"/>
+          </a:sp3d>
+        </p:spPr>
+        <p:style>
+          <a:lnRef idx="2">
+            <a:schemeClr val="accent1">
+              <a:shade val="15000"/>
+            </a:schemeClr>
+          </a:lnRef>
+          <a:fillRef idx="1">
+            <a:schemeClr val="accent1"/>
+          </a:fillRef>
+          <a:effectRef idx="0">
+            <a:schemeClr val="accent1"/>
+          </a:effectRef>
+          <a:fontRef idx="minor">
+            <a:schemeClr val="lt1"/>
+          </a:fontRef>
+        </p:style>
+        <p:txBody>
+          <a:bodyPr rtlCol="0" anchor="ctr"/>
+          <a:lstStyle/>
+          <a:p>
+            <a:pPr algn="ctr"/>
+            <a:endParaRPr lang="en-CA"/>
+          </a:p>
+        </p:txBody>
+      </p:sp>
+      <p:sp>
+        <p:nvSpPr>
+          <p:cNvPr id="29" name="Oval 28">
+            <a:extLst>
+              <a:ext uri="{FF2B5EF4-FFF2-40B4-BE49-F238E27FC236}">
+                <a16:creationId xmlns:a16="http://schemas.microsoft.com/office/drawing/2014/main" id="{2F7C1865-5E72-F196-99C2-FD19FE06AED2}"/>
+              </a:ext>
+            </a:extLst>
+          </p:cNvPr>
+          <p:cNvSpPr/>
+          <p:nvPr/>
+        </p:nvSpPr>
+        <p:spPr>
+          <a:xfrm>
+            <a:off x="6581774" y="4210050"/>
+            <a:ext cx="360000" cy="360000"/>
+          </a:xfrm>
+          <a:prstGeom prst="ellipse">
+            <a:avLst/>
+          </a:prstGeom>
+          <a:solidFill>
+            <a:schemeClr val="bg2"/>
+          </a:solidFill>
+          <a:ln w="38100">
+            <a:solidFill>
+              <a:schemeClr val="bg1"/>
+            </a:solidFill>
+          </a:ln>
+          <a:scene3d>
+            <a:camera prst="orthographicFront"/>
+            <a:lightRig rig="threePt" dir="t"/>
+          </a:scene3d>
+          <a:sp3d>
+            <a:bevelT w="38100"/>
+          </a:sp3d>
+        </p:spPr>
+        <p:style>
+          <a:lnRef idx="2">
+            <a:schemeClr val="accent1">
+              <a:shade val="15000"/>
+            </a:schemeClr>
+          </a:lnRef>
+          <a:fillRef idx="1">
+            <a:schemeClr val="accent1"/>
+          </a:fillRef>
+          <a:effectRef idx="0">
+            <a:schemeClr val="accent1"/>
+          </a:effectRef>
+          <a:fontRef idx="minor">
+            <a:schemeClr val="lt1"/>
+          </a:fontRef>
+        </p:style>
+        <p:txBody>
+          <a:bodyPr rtlCol="0" anchor="ctr"/>
+          <a:lstStyle/>
+          <a:p>
+            <a:pPr algn="ctr"/>
+            <a:endParaRPr lang="en-CA"/>
+          </a:p>
+        </p:txBody>
+      </p:sp>
+      <p:pic>
+        <p:nvPicPr>
+          <p:cNvPr id="33" name="Graphic 32" descr="Processor outline">
+            <a:extLst>
+              <a:ext uri="{FF2B5EF4-FFF2-40B4-BE49-F238E27FC236}">
+                <a16:creationId xmlns:a16="http://schemas.microsoft.com/office/drawing/2014/main" id="{233EAEB9-9C63-E0B5-8CFF-86012A6E94E7}"/>
+              </a:ext>
+            </a:extLst>
+          </p:cNvPr>
+          <p:cNvPicPr>
+            <a:picLocks noChangeAspect="1"/>
+          </p:cNvPicPr>
+          <p:nvPr/>
+        </p:nvPicPr>
+        <p:blipFill>
+          <a:blip r:embed="rId12">
+            <a:extLst>
+              <a:ext uri="{28A0092B-C50C-407E-A947-70E740481C1C}">
+                <a14:useLocalDpi xmlns:a14="http://schemas.microsoft.com/office/drawing/2010/main" val="0"/>
+              </a:ext>
+              <a:ext uri="{96DAC541-7B7A-43D3-8B79-37D633B846F1}">
+                <asvg:svgBlip xmlns:asvg="http://schemas.microsoft.com/office/drawing/2016/SVG/main" r:embed="rId13"/>
+              </a:ext>
+            </a:extLst>
+          </a:blip>
+          <a:stretch>
+            <a:fillRect/>
+          </a:stretch>
+        </p:blipFill>
+        <p:spPr>
+          <a:xfrm>
+            <a:off x="6575834" y="4194810"/>
+            <a:ext cx="375240" cy="375240"/>
           </a:xfrm>
           <a:prstGeom prst="rect">
             <a:avLst/>

</xml_diff>